<commit_message>
PPTX export: handle theme color of shape text with effects
Handle luminance modulation and offset (lighter and darker colors in
PowerPoint); not handling tinting/shading for now, as that seems to be
not used in DrawingML (only in WordprocessingML), and this code is for
shape text only at the moment.

Change-Id: I5e97f890d3072c7ef282ed4fb971362b3ddaaa4d
Reviewed-on: https://gerrit.libreoffice.org/c/core/+/126400
Reviewed-by: Miklos Vajna <vmiklos@collabora.com>
Tested-by: Jenkins
</commit_message>
<xml_diff>
--- a/oox/qa/unit/data/refer-to-theme.pptx
+++ b/oox/qa/unit/data/refer-to-theme.pptx
@@ -104,6 +104,11 @@
       </a:defRPr>
     </a:lvl9pPr>
   </p:defaultTextStyle>
+  <p:extLst>
+    <p:ext uri="{EFAFB233-063F-42B5-8137-9DF3F51BA10A}">
+      <p15:sldGuideLst xmlns:p15="http://schemas.microsoft.com/office/powerpoint/2012/main"/>
+    </p:ext>
+  </p:extLst>
 </p:presentation>
 </file>
 
@@ -254,7 +259,7 @@
           <a:p>
             <a:fld id="{4ABF388E-0003-4F3E-BCF8-ABF54CF9536E}" type="datetimeFigureOut">
               <a:rPr lang="en-US" smtClean="0"/>
-              <a:t>12/1/2021</a:t>
+              <a:t>12/3/2021</a:t>
             </a:fld>
             <a:endParaRPr lang="en-US"/>
           </a:p>
@@ -452,7 +457,7 @@
           <a:p>
             <a:fld id="{4ABF388E-0003-4F3E-BCF8-ABF54CF9536E}" type="datetimeFigureOut">
               <a:rPr lang="en-US" smtClean="0"/>
-              <a:t>12/1/2021</a:t>
+              <a:t>12/3/2021</a:t>
             </a:fld>
             <a:endParaRPr lang="en-US"/>
           </a:p>
@@ -660,7 +665,7 @@
           <a:p>
             <a:fld id="{4ABF388E-0003-4F3E-BCF8-ABF54CF9536E}" type="datetimeFigureOut">
               <a:rPr lang="en-US" smtClean="0"/>
-              <a:t>12/1/2021</a:t>
+              <a:t>12/3/2021</a:t>
             </a:fld>
             <a:endParaRPr lang="en-US"/>
           </a:p>
@@ -858,7 +863,7 @@
           <a:p>
             <a:fld id="{4ABF388E-0003-4F3E-BCF8-ABF54CF9536E}" type="datetimeFigureOut">
               <a:rPr lang="en-US" smtClean="0"/>
-              <a:t>12/1/2021</a:t>
+              <a:t>12/3/2021</a:t>
             </a:fld>
             <a:endParaRPr lang="en-US"/>
           </a:p>
@@ -1133,7 +1138,7 @@
           <a:p>
             <a:fld id="{4ABF388E-0003-4F3E-BCF8-ABF54CF9536E}" type="datetimeFigureOut">
               <a:rPr lang="en-US" smtClean="0"/>
-              <a:t>12/1/2021</a:t>
+              <a:t>12/3/2021</a:t>
             </a:fld>
             <a:endParaRPr lang="en-US"/>
           </a:p>
@@ -1398,7 +1403,7 @@
           <a:p>
             <a:fld id="{4ABF388E-0003-4F3E-BCF8-ABF54CF9536E}" type="datetimeFigureOut">
               <a:rPr lang="en-US" smtClean="0"/>
-              <a:t>12/1/2021</a:t>
+              <a:t>12/3/2021</a:t>
             </a:fld>
             <a:endParaRPr lang="en-US"/>
           </a:p>
@@ -1810,7 +1815,7 @@
           <a:p>
             <a:fld id="{4ABF388E-0003-4F3E-BCF8-ABF54CF9536E}" type="datetimeFigureOut">
               <a:rPr lang="en-US" smtClean="0"/>
-              <a:t>12/1/2021</a:t>
+              <a:t>12/3/2021</a:t>
             </a:fld>
             <a:endParaRPr lang="en-US"/>
           </a:p>
@@ -1951,7 +1956,7 @@
           <a:p>
             <a:fld id="{4ABF388E-0003-4F3E-BCF8-ABF54CF9536E}" type="datetimeFigureOut">
               <a:rPr lang="en-US" smtClean="0"/>
-              <a:t>12/1/2021</a:t>
+              <a:t>12/3/2021</a:t>
             </a:fld>
             <a:endParaRPr lang="en-US"/>
           </a:p>
@@ -2064,7 +2069,7 @@
           <a:p>
             <a:fld id="{4ABF388E-0003-4F3E-BCF8-ABF54CF9536E}" type="datetimeFigureOut">
               <a:rPr lang="en-US" smtClean="0"/>
-              <a:t>12/1/2021</a:t>
+              <a:t>12/3/2021</a:t>
             </a:fld>
             <a:endParaRPr lang="en-US"/>
           </a:p>
@@ -2375,7 +2380,7 @@
           <a:p>
             <a:fld id="{4ABF388E-0003-4F3E-BCF8-ABF54CF9536E}" type="datetimeFigureOut">
               <a:rPr lang="en-US" smtClean="0"/>
-              <a:t>12/1/2021</a:t>
+              <a:t>12/3/2021</a:t>
             </a:fld>
             <a:endParaRPr lang="en-US"/>
           </a:p>
@@ -2663,7 +2668,7 @@
           <a:p>
             <a:fld id="{4ABF388E-0003-4F3E-BCF8-ABF54CF9536E}" type="datetimeFigureOut">
               <a:rPr lang="en-US" smtClean="0"/>
-              <a:t>12/1/2021</a:t>
+              <a:t>12/3/2021</a:t>
             </a:fld>
             <a:endParaRPr lang="en-US"/>
           </a:p>
@@ -2904,7 +2909,7 @@
           <a:p>
             <a:fld id="{4ABF388E-0003-4F3E-BCF8-ABF54CF9536E}" type="datetimeFigureOut">
               <a:rPr lang="en-US" smtClean="0"/>
-              <a:t>12/1/2021</a:t>
+              <a:t>12/3/2021</a:t>
             </a:fld>
             <a:endParaRPr lang="en-US"/>
           </a:p>
@@ -3375,6 +3380,119 @@
           </a:p>
         </p:txBody>
       </p:sp>
+      <p:sp>
+        <p:nvSpPr>
+          <p:cNvPr id="3" name="Rectangle: Rounded Corners 2">
+            <a:extLst>
+              <a:ext uri="{FF2B5EF4-FFF2-40B4-BE49-F238E27FC236}">
+                <a16:creationId xmlns:a16="http://schemas.microsoft.com/office/drawing/2014/main" id="{0EC29854-DC58-4C2B-A5CA-6E0CB8F5F214}"/>
+              </a:ext>
+            </a:extLst>
+          </p:cNvPr>
+          <p:cNvSpPr/>
+          <p:nvPr/>
+        </p:nvSpPr>
+        <p:spPr>
+          <a:xfrm>
+            <a:off x="3710609" y="1222512"/>
+            <a:ext cx="2932044" cy="1590261"/>
+          </a:xfrm>
+          <a:prstGeom prst="roundRect">
+            <a:avLst/>
+          </a:prstGeom>
+          <a:noFill/>
+        </p:spPr>
+        <p:style>
+          <a:lnRef idx="2">
+            <a:schemeClr val="accent1">
+              <a:shade val="50000"/>
+            </a:schemeClr>
+          </a:lnRef>
+          <a:fillRef idx="1">
+            <a:schemeClr val="accent1"/>
+          </a:fillRef>
+          <a:effectRef idx="0">
+            <a:schemeClr val="accent1"/>
+          </a:effectRef>
+          <a:fontRef idx="minor">
+            <a:schemeClr val="lt1"/>
+          </a:fontRef>
+        </p:style>
+        <p:txBody>
+          <a:bodyPr rtlCol="0" anchor="ctr"/>
+          <a:lstStyle/>
+          <a:p>
+            <a:pPr algn="ctr"/>
+            <a:r>
+              <a:rPr lang="en-US" dirty="0">
+                <a:solidFill>
+                  <a:schemeClr val="accent1">
+                    <a:lumMod val="40000"/>
+                    <a:lumOff val="60000"/>
+                  </a:schemeClr>
+                </a:solidFill>
+              </a:rPr>
+              <a:t>Shape 1, 60% lighter</a:t>
+            </a:r>
+          </a:p>
+        </p:txBody>
+      </p:sp>
+      <p:sp>
+        <p:nvSpPr>
+          <p:cNvPr id="5" name="Rectangle: Rounded Corners 4">
+            <a:extLst>
+              <a:ext uri="{FF2B5EF4-FFF2-40B4-BE49-F238E27FC236}">
+                <a16:creationId xmlns:a16="http://schemas.microsoft.com/office/drawing/2014/main" id="{54556E1E-5035-4F55-8909-75495A01693A}"/>
+              </a:ext>
+            </a:extLst>
+          </p:cNvPr>
+          <p:cNvSpPr/>
+          <p:nvPr/>
+        </p:nvSpPr>
+        <p:spPr>
+          <a:xfrm>
+            <a:off x="6715540" y="1222512"/>
+            <a:ext cx="2932044" cy="1590261"/>
+          </a:xfrm>
+          <a:prstGeom prst="roundRect">
+            <a:avLst/>
+          </a:prstGeom>
+          <a:noFill/>
+        </p:spPr>
+        <p:style>
+          <a:lnRef idx="2">
+            <a:schemeClr val="accent1">
+              <a:shade val="50000"/>
+            </a:schemeClr>
+          </a:lnRef>
+          <a:fillRef idx="1">
+            <a:schemeClr val="accent1"/>
+          </a:fillRef>
+          <a:effectRef idx="0">
+            <a:schemeClr val="accent1"/>
+          </a:effectRef>
+          <a:fontRef idx="minor">
+            <a:schemeClr val="lt1"/>
+          </a:fontRef>
+        </p:style>
+        <p:txBody>
+          <a:bodyPr rtlCol="0" anchor="ctr"/>
+          <a:lstStyle/>
+          <a:p>
+            <a:pPr algn="ctr"/>
+            <a:r>
+              <a:rPr lang="en-US" dirty="0">
+                <a:solidFill>
+                  <a:schemeClr val="accent1">
+                    <a:lumMod val="75000"/>
+                  </a:schemeClr>
+                </a:solidFill>
+              </a:rPr>
+              <a:t>Shape 1, 25% darker</a:t>
+            </a:r>
+          </a:p>
+        </p:txBody>
+      </p:sp>
     </p:spTree>
     <p:extLst>
       <p:ext uri="{BB962C8B-B14F-4D97-AF65-F5344CB8AC3E}">

</xml_diff>